<commit_message>
minor change in ppt
</commit_message>
<xml_diff>
--- a/Predicting Loan Application Status.pptx
+++ b/Predicting Loan Application Status.pptx
@@ -6483,7 +6483,7 @@
           </a:effectLst>
           <a:extLst>
             <a:ext uri="{91240B29-F687-4f45-9708-019B960494DF}">
-              <a14:hiddenLine xmlns:a16="http://schemas.microsoft.com/office/drawing/2014/main" xmlns:p14="http://schemas.microsoft.com/office/powerpoint/2010/main" xmlns:a14="http://schemas.microsoft.com/office/drawing/2010/main" xmlns="" w="9525">
+              <a14:hiddenLine xmlns="" xmlns:a14="http://schemas.microsoft.com/office/drawing/2010/main" xmlns:p14="http://schemas.microsoft.com/office/powerpoint/2010/main" xmlns:a16="http://schemas.microsoft.com/office/drawing/2014/main" w="9525">
                 <a:solidFill>
                   <a:srgbClr val="000000"/>
                 </a:solidFill>
@@ -7914,10 +7914,10 @@
           <a:lstStyle/>
           <a:p>
             <a:r>
-              <a:rPr lang="en-US"/>
+              <a:rPr lang="en-US" dirty="0"/>
               <a:t>Results</a:t>
             </a:r>
-            <a:endParaRPr lang="en-CA"/>
+            <a:endParaRPr lang="en-CA" dirty="0"/>
           </a:p>
         </p:txBody>
       </p:sp>
@@ -7992,6 +7992,12 @@
             <a:normAutofit/>
           </a:bodyPr>
           <a:lstStyle/>
+          <a:p>
+            <a:r>
+              <a:rPr lang="en-US" dirty="0"/>
+              <a:t>Model: Random Forest Classifier</a:t>
+            </a:r>
+          </a:p>
           <a:p>
             <a:r>
               <a:rPr lang="en-US" dirty="0"/>
@@ -8751,15 +8757,6 @@
 </file>
 
 <file path=customXml/item2.xml><?xml version="1.0" encoding="utf-8"?>
-<p:properties xmlns:p="http://schemas.microsoft.com/office/2006/metadata/properties" xmlns:xsi="http://www.w3.org/2001/XMLSchema-instance" xmlns:pc="http://schemas.microsoft.com/office/infopath/2007/PartnerControls">
-  <documentManagement>
-    <Status xmlns="71af3243-3dd4-4a8d-8c0d-dd76da1f02a5">Not started</Status>
-    <MediaServiceKeyPoints xmlns="71af3243-3dd4-4a8d-8c0d-dd76da1f02a5" xsi:nil="true"/>
-  </documentManagement>
-</p:properties>
-</file>
-
-<file path=customXml/item3.xml><?xml version="1.0" encoding="utf-8"?>
 <ct:contentTypeSchema xmlns:ct="http://schemas.microsoft.com/office/2006/metadata/contentType" xmlns:ma="http://schemas.microsoft.com/office/2006/metadata/properties/metaAttributes" ct:_="" ma:_="" ma:contentTypeName="Document" ma:contentTypeID="0x01010079F111ED35F8CC479449609E8A0923A6" ma:contentTypeVersion="12" ma:contentTypeDescription="Create a new document." ma:contentTypeScope="" ma:versionID="a410dd7f93c95333ffa1b60ed6adedd1">
   <xsd:schema xmlns:xsd="http://www.w3.org/2001/XMLSchema" xmlns:xs="http://www.w3.org/2001/XMLSchema" xmlns:p="http://schemas.microsoft.com/office/2006/metadata/properties" xmlns:ns2="71af3243-3dd4-4a8d-8c0d-dd76da1f02a5" xmlns:ns3="16c05727-aa75-4e4a-9b5f-8a80a1165891" targetNamespace="http://schemas.microsoft.com/office/2006/metadata/properties" ma:root="true" ma:fieldsID="a936d9baba76aa3866493feff160faab" ns2:_="" ns3:_="">
     <xsd:import namespace="71af3243-3dd4-4a8d-8c0d-dd76da1f02a5"/>
@@ -8980,6 +8977,15 @@
 </ct:contentTypeSchema>
 </file>
 
+<file path=customXml/item3.xml><?xml version="1.0" encoding="utf-8"?>
+<p:properties xmlns:p="http://schemas.microsoft.com/office/2006/metadata/properties" xmlns:xsi="http://www.w3.org/2001/XMLSchema-instance" xmlns:pc="http://schemas.microsoft.com/office/infopath/2007/PartnerControls">
+  <documentManagement>
+    <Status xmlns="71af3243-3dd4-4a8d-8c0d-dd76da1f02a5">Not started</Status>
+    <MediaServiceKeyPoints xmlns="71af3243-3dd4-4a8d-8c0d-dd76da1f02a5" xsi:nil="true"/>
+  </documentManagement>
+</p:properties>
+</file>
+
 <file path=customXml/itemProps1.xml><?xml version="1.0" encoding="utf-8"?>
 <ds:datastoreItem xmlns:ds="http://schemas.openxmlformats.org/officeDocument/2006/customXml" ds:itemID="{64B270AB-C138-415C-897E-3C24487DECF1}">
   <ds:schemaRefs>
@@ -8989,16 +8995,6 @@
 </file>
 
 <file path=customXml/itemProps2.xml><?xml version="1.0" encoding="utf-8"?>
-<ds:datastoreItem xmlns:ds="http://schemas.openxmlformats.org/officeDocument/2006/customXml" ds:itemID="{2C4C00F4-06E9-43E3-AD97-88A857CEFA82}">
-  <ds:schemaRefs>
-    <ds:schemaRef ds:uri="http://schemas.microsoft.com/office/2006/metadata/properties"/>
-    <ds:schemaRef ds:uri="http://schemas.microsoft.com/office/infopath/2007/PartnerControls"/>
-    <ds:schemaRef ds:uri="71af3243-3dd4-4a8d-8c0d-dd76da1f02a5"/>
-  </ds:schemaRefs>
-</ds:datastoreItem>
-</file>
-
-<file path=customXml/itemProps3.xml><?xml version="1.0" encoding="utf-8"?>
 <ds:datastoreItem xmlns:ds="http://schemas.openxmlformats.org/officeDocument/2006/customXml" ds:itemID="{0585E981-8C91-4205-A0C3-C991F42B4C9E}">
   <ds:schemaRefs>
     <ds:schemaRef ds:uri="http://schemas.microsoft.com/office/2006/metadata/contentType"/>
@@ -9015,4 +9011,14 @@
     <ds:schemaRef ds:uri="http://schemas.microsoft.com/internal/obd"/>
   </ds:schemaRefs>
 </ds:datastoreItem>
+</file>
+
+<file path=customXml/itemProps3.xml><?xml version="1.0" encoding="utf-8"?>
+<ds:datastoreItem xmlns:ds="http://schemas.openxmlformats.org/officeDocument/2006/customXml" ds:itemID="{2C4C00F4-06E9-43E3-AD97-88A857CEFA82}">
+  <ds:schemaRefs>
+    <ds:schemaRef ds:uri="http://schemas.microsoft.com/office/2006/metadata/properties"/>
+    <ds:schemaRef ds:uri="http://schemas.microsoft.com/office/infopath/2007/PartnerControls"/>
+    <ds:schemaRef ds:uri="71af3243-3dd4-4a8d-8c0d-dd76da1f02a5"/>
+  </ds:schemaRefs>
+</ds:datastoreItem>
 </file>
</xml_diff>

<commit_message>
changed target output from Y/N to 1/0
</commit_message>
<xml_diff>
--- a/Predicting Loan Application Status.pptx
+++ b/Predicting Loan Application Status.pptx
@@ -6483,7 +6483,7 @@
           </a:effectLst>
           <a:extLst>
             <a:ext uri="{91240B29-F687-4f45-9708-019B960494DF}">
-              <a14:hiddenLine xmlns="" xmlns:a14="http://schemas.microsoft.com/office/drawing/2010/main" xmlns:p14="http://schemas.microsoft.com/office/powerpoint/2010/main" xmlns:a16="http://schemas.microsoft.com/office/drawing/2014/main" w="9525">
+              <a14:hiddenLine xmlns:a16="http://schemas.microsoft.com/office/drawing/2014/main" xmlns:p14="http://schemas.microsoft.com/office/powerpoint/2010/main" xmlns:a14="http://schemas.microsoft.com/office/drawing/2010/main" xmlns="" w="9525">
                 <a:solidFill>
                   <a:srgbClr val="000000"/>
                 </a:solidFill>
@@ -8001,19 +8001,19 @@
           <a:p>
             <a:r>
               <a:rPr lang="en-US" dirty="0"/>
-              <a:t>Accuracy: 81%</a:t>
+              <a:t>Accuracy: 83%</a:t>
             </a:r>
           </a:p>
           <a:p>
             <a:r>
               <a:rPr lang="en-US" dirty="0"/>
-              <a:t>Precision: 41%</a:t>
+              <a:t>Precision: 46%</a:t>
             </a:r>
           </a:p>
           <a:p>
             <a:r>
               <a:rPr lang="en-US" dirty="0"/>
-              <a:t>Negative Prediction: 98%</a:t>
+              <a:t>Negative Prediction: 99%</a:t>
             </a:r>
           </a:p>
           <a:p>
@@ -8026,10 +8026,10 @@
       </p:sp>
       <p:pic>
         <p:nvPicPr>
-          <p:cNvPr id="8" name="Picture 7">
+          <p:cNvPr id="4" name="Picture 3">
             <a:extLst>
               <a:ext uri="{FF2B5EF4-FFF2-40B4-BE49-F238E27FC236}">
-                <a16:creationId xmlns:a16="http://schemas.microsoft.com/office/drawing/2014/main" id="{6C8EA15B-CB30-7950-766A-38A5BF83C261}"/>
+                <a16:creationId xmlns:a16="http://schemas.microsoft.com/office/drawing/2014/main" id="{DDB2B6F6-7719-2A70-1C93-345402D48F95}"/>
               </a:ext>
             </a:extLst>
           </p:cNvPr>
@@ -8046,8 +8046,8 @@
         </p:blipFill>
         <p:spPr>
           <a:xfrm>
-            <a:off x="43484" y="1766655"/>
-            <a:ext cx="4858428" cy="3324689"/>
+            <a:off x="57773" y="1771418"/>
+            <a:ext cx="4829849" cy="3315163"/>
           </a:xfrm>
           <a:prstGeom prst="rect">
             <a:avLst/>
@@ -8757,6 +8757,15 @@
 </file>
 
 <file path=customXml/item2.xml><?xml version="1.0" encoding="utf-8"?>
+<p:properties xmlns:p="http://schemas.microsoft.com/office/2006/metadata/properties" xmlns:xsi="http://www.w3.org/2001/XMLSchema-instance" xmlns:pc="http://schemas.microsoft.com/office/infopath/2007/PartnerControls">
+  <documentManagement>
+    <Status xmlns="71af3243-3dd4-4a8d-8c0d-dd76da1f02a5">Not started</Status>
+    <MediaServiceKeyPoints xmlns="71af3243-3dd4-4a8d-8c0d-dd76da1f02a5" xsi:nil="true"/>
+  </documentManagement>
+</p:properties>
+</file>
+
+<file path=customXml/item3.xml><?xml version="1.0" encoding="utf-8"?>
 <ct:contentTypeSchema xmlns:ct="http://schemas.microsoft.com/office/2006/metadata/contentType" xmlns:ma="http://schemas.microsoft.com/office/2006/metadata/properties/metaAttributes" ct:_="" ma:_="" ma:contentTypeName="Document" ma:contentTypeID="0x01010079F111ED35F8CC479449609E8A0923A6" ma:contentTypeVersion="12" ma:contentTypeDescription="Create a new document." ma:contentTypeScope="" ma:versionID="a410dd7f93c95333ffa1b60ed6adedd1">
   <xsd:schema xmlns:xsd="http://www.w3.org/2001/XMLSchema" xmlns:xs="http://www.w3.org/2001/XMLSchema" xmlns:p="http://schemas.microsoft.com/office/2006/metadata/properties" xmlns:ns2="71af3243-3dd4-4a8d-8c0d-dd76da1f02a5" xmlns:ns3="16c05727-aa75-4e4a-9b5f-8a80a1165891" targetNamespace="http://schemas.microsoft.com/office/2006/metadata/properties" ma:root="true" ma:fieldsID="a936d9baba76aa3866493feff160faab" ns2:_="" ns3:_="">
     <xsd:import namespace="71af3243-3dd4-4a8d-8c0d-dd76da1f02a5"/>
@@ -8977,15 +8986,6 @@
 </ct:contentTypeSchema>
 </file>
 
-<file path=customXml/item3.xml><?xml version="1.0" encoding="utf-8"?>
-<p:properties xmlns:p="http://schemas.microsoft.com/office/2006/metadata/properties" xmlns:xsi="http://www.w3.org/2001/XMLSchema-instance" xmlns:pc="http://schemas.microsoft.com/office/infopath/2007/PartnerControls">
-  <documentManagement>
-    <Status xmlns="71af3243-3dd4-4a8d-8c0d-dd76da1f02a5">Not started</Status>
-    <MediaServiceKeyPoints xmlns="71af3243-3dd4-4a8d-8c0d-dd76da1f02a5" xsi:nil="true"/>
-  </documentManagement>
-</p:properties>
-</file>
-
 <file path=customXml/itemProps1.xml><?xml version="1.0" encoding="utf-8"?>
 <ds:datastoreItem xmlns:ds="http://schemas.openxmlformats.org/officeDocument/2006/customXml" ds:itemID="{64B270AB-C138-415C-897E-3C24487DECF1}">
   <ds:schemaRefs>
@@ -8995,6 +8995,16 @@
 </file>
 
 <file path=customXml/itemProps2.xml><?xml version="1.0" encoding="utf-8"?>
+<ds:datastoreItem xmlns:ds="http://schemas.openxmlformats.org/officeDocument/2006/customXml" ds:itemID="{2C4C00F4-06E9-43E3-AD97-88A857CEFA82}">
+  <ds:schemaRefs>
+    <ds:schemaRef ds:uri="http://schemas.microsoft.com/office/2006/metadata/properties"/>
+    <ds:schemaRef ds:uri="http://schemas.microsoft.com/office/infopath/2007/PartnerControls"/>
+    <ds:schemaRef ds:uri="71af3243-3dd4-4a8d-8c0d-dd76da1f02a5"/>
+  </ds:schemaRefs>
+</ds:datastoreItem>
+</file>
+
+<file path=customXml/itemProps3.xml><?xml version="1.0" encoding="utf-8"?>
 <ds:datastoreItem xmlns:ds="http://schemas.openxmlformats.org/officeDocument/2006/customXml" ds:itemID="{0585E981-8C91-4205-A0C3-C991F42B4C9E}">
   <ds:schemaRefs>
     <ds:schemaRef ds:uri="http://schemas.microsoft.com/office/2006/metadata/contentType"/>
@@ -9011,14 +9021,4 @@
     <ds:schemaRef ds:uri="http://schemas.microsoft.com/internal/obd"/>
   </ds:schemaRefs>
 </ds:datastoreItem>
-</file>
-
-<file path=customXml/itemProps3.xml><?xml version="1.0" encoding="utf-8"?>
-<ds:datastoreItem xmlns:ds="http://schemas.openxmlformats.org/officeDocument/2006/customXml" ds:itemID="{2C4C00F4-06E9-43E3-AD97-88A857CEFA82}">
-  <ds:schemaRefs>
-    <ds:schemaRef ds:uri="http://schemas.microsoft.com/office/2006/metadata/properties"/>
-    <ds:schemaRef ds:uri="http://schemas.microsoft.com/office/infopath/2007/PartnerControls"/>
-    <ds:schemaRef ds:uri="71af3243-3dd4-4a8d-8c0d-dd76da1f02a5"/>
-  </ds:schemaRefs>
-</ds:datastoreItem>
 </file>
</xml_diff>